<commit_message>
Updated Week 3 project presentation
</commit_message>
<xml_diff>
--- a/Week_3_Project_PPT_.pptx
+++ b/Week_3_Project_PPT_.pptx
@@ -247,7 +247,7 @@
   </p:defaultTextStyle>
   <p:extLst>
     <p:ext uri="{EFAFB233-063F-42B5-8137-9DF3F51BA10A}">
-      <p15:sldGuideLst xmlns:p15="http://schemas.microsoft.com/office/powerpoint/2012/main" xmlns="">
+      <p15:sldGuideLst xmlns="" xmlns:p15="http://schemas.microsoft.com/office/powerpoint/2012/main">
         <p15:guide id="1" orient="horz" pos="792">
           <p15:clr>
             <a:srgbClr val="A4A3A4"/>
@@ -266,7 +266,7 @@
       </p15:sldGuideLst>
     </p:ext>
     <p:ext uri="http://customooxmlschemas.google.com/">
-      <go:slidesCustomData xmlns:mc="http://schemas.openxmlformats.org/markup-compatibility/2006" xmlns:mv="urn:schemas-microsoft-com:mac:vml" xmlns:c="http://schemas.openxmlformats.org/drawingml/2006/chart" xmlns:dgm="http://schemas.openxmlformats.org/drawingml/2006/diagram" xmlns:o="urn:schemas-microsoft-com:office:office" xmlns:v="urn:schemas-microsoft-com:vml" xmlns:pvml="urn:schemas-microsoft-com:office:powerpoint" xmlns:com="http://schemas.openxmlformats.org/drawingml/2006/compatibility" xmlns:p14="http://schemas.microsoft.com/office/powerpoint/2010/main" xmlns:p15="http://schemas.microsoft.com/office/powerpoint/2012/main" xmlns:go="http://customooxmlschemas.google.com/" xmlns="" r:id="rId220" roundtripDataSignature="AMtx7miWNY2LB4ETJwrL8F0N+EK9hEhqUQ=="/>
+      <go:slidesCustomData xmlns="" xmlns:go="http://customooxmlschemas.google.com/" xmlns:p15="http://schemas.microsoft.com/office/powerpoint/2012/main" xmlns:p14="http://schemas.microsoft.com/office/powerpoint/2010/main" xmlns:com="http://schemas.openxmlformats.org/drawingml/2006/compatibility" xmlns:pvml="urn:schemas-microsoft-com:office:powerpoint" xmlns:v="urn:schemas-microsoft-com:vml" xmlns:o="urn:schemas-microsoft-com:office:office" xmlns:dgm="http://schemas.openxmlformats.org/drawingml/2006/diagram" xmlns:c="http://schemas.openxmlformats.org/drawingml/2006/chart" xmlns:mv="urn:schemas-microsoft-com:mac:vml" xmlns:mc="http://schemas.openxmlformats.org/markup-compatibility/2006" r:id="rId220" roundtripDataSignature="AMtx7miWNY2LB4ETJwrL8F0N+EK9hEhqUQ=="/>
     </p:ext>
   </p:extLst>
 </p:presentation>
@@ -422,7 +422,7 @@
           <p:cNvPr id="13" name="Google Shape;110;p4" descr="A close up of a sign&#10;&#10;Description automatically generated">
             <a:extLst>
               <a:ext uri="{FF2B5EF4-FFF2-40B4-BE49-F238E27FC236}">
-                <a16:creationId xmlns:a16="http://schemas.microsoft.com/office/drawing/2014/main" xmlns="" id="{CE849A3B-BCF0-B774-F89E-81965C71F93E}"/>
+                <a16:creationId xmlns="" xmlns:a16="http://schemas.microsoft.com/office/drawing/2014/main" id="{CE849A3B-BCF0-B774-F89E-81965C71F93E}"/>
               </a:ext>
             </a:extLst>
           </p:cNvPr>
@@ -455,7 +455,7 @@
           <p:cNvPr id="15" name="Rectangle 14">
             <a:extLst>
               <a:ext uri="{FF2B5EF4-FFF2-40B4-BE49-F238E27FC236}">
-                <a16:creationId xmlns:a16="http://schemas.microsoft.com/office/drawing/2014/main" xmlns="" id="{E153E6A6-60E4-FE14-1CBC-8CC211274D1C}"/>
+                <a16:creationId xmlns="" xmlns:a16="http://schemas.microsoft.com/office/drawing/2014/main" id="{E153E6A6-60E4-FE14-1CBC-8CC211274D1C}"/>
               </a:ext>
             </a:extLst>
           </p:cNvPr>
@@ -509,7 +509,7 @@
           <p:cNvPr id="19" name="Rectangle 18">
             <a:extLst>
               <a:ext uri="{FF2B5EF4-FFF2-40B4-BE49-F238E27FC236}">
-                <a16:creationId xmlns:a16="http://schemas.microsoft.com/office/drawing/2014/main" xmlns="" id="{2C7CE881-772B-9023-3054-4B219B75D755}"/>
+                <a16:creationId xmlns="" xmlns:a16="http://schemas.microsoft.com/office/drawing/2014/main" id="{2C7CE881-772B-9023-3054-4B219B75D755}"/>
               </a:ext>
             </a:extLst>
           </p:cNvPr>
@@ -561,7 +561,7 @@
           <p:cNvPr id="31" name="Picture 30" descr="A blue and white background&#10;&#10;Description automatically generated with medium confidence">
             <a:extLst>
               <a:ext uri="{FF2B5EF4-FFF2-40B4-BE49-F238E27FC236}">
-                <a16:creationId xmlns:a16="http://schemas.microsoft.com/office/drawing/2014/main" xmlns="" id="{16A7B69A-9B14-87FE-841D-37F0A91D141D}"/>
+                <a16:creationId xmlns="" xmlns:a16="http://schemas.microsoft.com/office/drawing/2014/main" id="{16A7B69A-9B14-87FE-841D-37F0A91D141D}"/>
               </a:ext>
             </a:extLst>
           </p:cNvPr>
@@ -592,7 +592,7 @@
           <p:cNvPr id="2" name="Rectangle 1">
             <a:extLst>
               <a:ext uri="{FF2B5EF4-FFF2-40B4-BE49-F238E27FC236}">
-                <a16:creationId xmlns:a16="http://schemas.microsoft.com/office/drawing/2014/main" xmlns="" id="{37B91A16-5D54-2FC0-B0FD-A78085FC1313}"/>
+                <a16:creationId xmlns="" xmlns:a16="http://schemas.microsoft.com/office/drawing/2014/main" id="{37B91A16-5D54-2FC0-B0FD-A78085FC1313}"/>
               </a:ext>
             </a:extLst>
           </p:cNvPr>
@@ -1340,7 +1340,7 @@
   </p:txStyles>
   <p:extLst>
     <p:ext uri="{27BBF7A9-308A-43DC-89C8-2F10F3537804}">
-      <p15:sldGuideLst xmlns:p15="http://schemas.microsoft.com/office/powerpoint/2012/main" xmlns="">
+      <p15:sldGuideLst xmlns="" xmlns:p15="http://schemas.microsoft.com/office/powerpoint/2012/main">
         <p15:guide id="1" orient="horz" pos="2160">
           <p15:clr>
             <a:srgbClr val="F26B43"/>
@@ -1379,7 +1379,7 @@
           <p:cNvPr id="2" name="Picture 1" descr="A person sitting at a desk with a computer&#10;&#10;Description automatically generated">
             <a:extLst>
               <a:ext uri="{FF2B5EF4-FFF2-40B4-BE49-F238E27FC236}">
-                <a16:creationId xmlns:a16="http://schemas.microsoft.com/office/drawing/2014/main" xmlns="" id="{07B8740D-C76F-46FC-AEFB-23FB0614DB0C}"/>
+                <a16:creationId xmlns="" xmlns:a16="http://schemas.microsoft.com/office/drawing/2014/main" id="{07B8740D-C76F-46FC-AEFB-23FB0614DB0C}"/>
               </a:ext>
             </a:extLst>
           </p:cNvPr>
@@ -1409,7 +1409,7 @@
           <p:cNvPr id="4" name="Rectangle: Rounded Corners 3">
             <a:extLst>
               <a:ext uri="{FF2B5EF4-FFF2-40B4-BE49-F238E27FC236}">
-                <a16:creationId xmlns:a16="http://schemas.microsoft.com/office/drawing/2014/main" xmlns="" id="{C1857762-AD52-483C-B3E1-635C5BBC6F2F}"/>
+                <a16:creationId xmlns="" xmlns:a16="http://schemas.microsoft.com/office/drawing/2014/main" id="{C1857762-AD52-483C-B3E1-635C5BBC6F2F}"/>
               </a:ext>
             </a:extLst>
           </p:cNvPr>
@@ -1466,7 +1466,7 @@
           <p:cNvPr id="5" name="TextBox 4">
             <a:extLst>
               <a:ext uri="{FF2B5EF4-FFF2-40B4-BE49-F238E27FC236}">
-                <a16:creationId xmlns:a16="http://schemas.microsoft.com/office/drawing/2014/main" xmlns="" id="{D5067E9C-C7B9-4476-9708-CBB3F66FD892}"/>
+                <a16:creationId xmlns="" xmlns:a16="http://schemas.microsoft.com/office/drawing/2014/main" id="{D5067E9C-C7B9-4476-9708-CBB3F66FD892}"/>
               </a:ext>
             </a:extLst>
           </p:cNvPr>
@@ -1552,7 +1552,7 @@
           <p:cNvPr id="6" name="Group 5">
             <a:extLst>
               <a:ext uri="{FF2B5EF4-FFF2-40B4-BE49-F238E27FC236}">
-                <a16:creationId xmlns:a16="http://schemas.microsoft.com/office/drawing/2014/main" xmlns="" id="{D7224A59-2417-428A-A991-E468431BB817}"/>
+                <a16:creationId xmlns="" xmlns:a16="http://schemas.microsoft.com/office/drawing/2014/main" id="{D7224A59-2417-428A-A991-E468431BB817}"/>
               </a:ext>
             </a:extLst>
           </p:cNvPr>
@@ -1572,7 +1572,7 @@
             <p:cNvPr id="7" name="Picture 6" descr="A close up of a logo&#10;&#10;Description automatically generated">
               <a:extLst>
                 <a:ext uri="{FF2B5EF4-FFF2-40B4-BE49-F238E27FC236}">
-                  <a16:creationId xmlns:a16="http://schemas.microsoft.com/office/drawing/2014/main" xmlns="" id="{BD3530AF-9771-470E-A9BF-F28AA2275338}"/>
+                  <a16:creationId xmlns="" xmlns:a16="http://schemas.microsoft.com/office/drawing/2014/main" id="{BD3530AF-9771-470E-A9BF-F28AA2275338}"/>
                 </a:ext>
               </a:extLst>
             </p:cNvPr>
@@ -1608,7 +1608,7 @@
             <p:cNvPr id="8" name="Picture 7" descr="A yellow and red shell logo&#10;&#10;Description automatically generated">
               <a:extLst>
                 <a:ext uri="{FF2B5EF4-FFF2-40B4-BE49-F238E27FC236}">
-                  <a16:creationId xmlns:a16="http://schemas.microsoft.com/office/drawing/2014/main" xmlns="" id="{75E6A819-9F3F-4787-A707-A7415C302BFA}"/>
+                  <a16:creationId xmlns="" xmlns:a16="http://schemas.microsoft.com/office/drawing/2014/main" id="{75E6A819-9F3F-4787-A707-A7415C302BFA}"/>
                 </a:ext>
               </a:extLst>
             </p:cNvPr>
@@ -1669,7 +1669,7 @@
           <p:cNvPr id="2" name="TextBox 1">
             <a:extLst>
               <a:ext uri="{FF2B5EF4-FFF2-40B4-BE49-F238E27FC236}">
-                <a16:creationId xmlns:a16="http://schemas.microsoft.com/office/drawing/2014/main" xmlns="" id="{B094E319-C77C-49E2-964C-6E125D716194}"/>
+                <a16:creationId xmlns="" xmlns:a16="http://schemas.microsoft.com/office/drawing/2014/main" id="{B094E319-C77C-49E2-964C-6E125D716194}"/>
               </a:ext>
             </a:extLst>
           </p:cNvPr>
@@ -1713,7 +1713,7 @@
           <p:cNvPr id="3" name="TextBox 2">
             <a:extLst>
               <a:ext uri="{FF2B5EF4-FFF2-40B4-BE49-F238E27FC236}">
-                <a16:creationId xmlns:a16="http://schemas.microsoft.com/office/drawing/2014/main" xmlns="" id="{8E1F3497-5370-4874-9908-5AD45214E10B}"/>
+                <a16:creationId xmlns="" xmlns:a16="http://schemas.microsoft.com/office/drawing/2014/main" id="{8E1F3497-5370-4874-9908-5AD45214E10B}"/>
               </a:ext>
             </a:extLst>
           </p:cNvPr>
@@ -1755,7 +1755,7 @@
           <p:cNvPr id="4" name="TextBox 3">
             <a:extLst>
               <a:ext uri="{FF2B5EF4-FFF2-40B4-BE49-F238E27FC236}">
-                <a16:creationId xmlns:a16="http://schemas.microsoft.com/office/drawing/2014/main" xmlns="" id="{ECE830DD-8813-42EB-B27B-B7D85423D0C7}"/>
+                <a16:creationId xmlns="" xmlns:a16="http://schemas.microsoft.com/office/drawing/2014/main" id="{ECE830DD-8813-42EB-B27B-B7D85423D0C7}"/>
               </a:ext>
             </a:extLst>
           </p:cNvPr>
@@ -1792,7 +1792,7 @@
                 <a:hlinkClick r:id="rId2">
                   <a:extLst>
                     <a:ext uri="{A12FA001-AC4F-418D-AE19-62706E023703}">
-                      <ahyp:hlinkClr xmlns:ahyp="http://schemas.microsoft.com/office/drawing/2018/hyperlinkcolor" xmlns="" val="tx"/>
+                      <ahyp:hlinkClr xmlns="" xmlns:ahyp="http://schemas.microsoft.com/office/drawing/2018/hyperlinkcolor" val="tx"/>
                     </a:ext>
                   </a:extLst>
                 </a:hlinkClick>
@@ -1813,7 +1813,7 @@
           <p:cNvPr id="5" name="Straight Connector 4">
             <a:extLst>
               <a:ext uri="{FF2B5EF4-FFF2-40B4-BE49-F238E27FC236}">
-                <a16:creationId xmlns:a16="http://schemas.microsoft.com/office/drawing/2014/main" xmlns="" id="{CA22F707-7F22-48A3-97EC-98EFB1023A55}"/>
+                <a16:creationId xmlns="" xmlns:a16="http://schemas.microsoft.com/office/drawing/2014/main" id="{CA22F707-7F22-48A3-97EC-98EFB1023A55}"/>
               </a:ext>
             </a:extLst>
           </p:cNvPr>
@@ -1856,7 +1856,7 @@
           <p:cNvPr id="6" name="Picture 5" descr="A ladder leading to a large yellow circle&#10;&#10;Description automatically generated">
             <a:extLst>
               <a:ext uri="{FF2B5EF4-FFF2-40B4-BE49-F238E27FC236}">
-                <a16:creationId xmlns:a16="http://schemas.microsoft.com/office/drawing/2014/main" xmlns="" id="{E2920B14-B344-4926-9729-BC7EBD91FF9A}"/>
+                <a16:creationId xmlns="" xmlns:a16="http://schemas.microsoft.com/office/drawing/2014/main" id="{E2920B14-B344-4926-9729-BC7EBD91FF9A}"/>
               </a:ext>
             </a:extLst>
           </p:cNvPr>
@@ -1887,7 +1887,7 @@
           <p:cNvPr id="7" name="TextBox 6">
             <a:extLst>
               <a:ext uri="{FF2B5EF4-FFF2-40B4-BE49-F238E27FC236}">
-                <a16:creationId xmlns:a16="http://schemas.microsoft.com/office/drawing/2014/main" xmlns="" id="{6C264928-EACB-4739-BDDA-6799C99356F3}"/>
+                <a16:creationId xmlns="" xmlns:a16="http://schemas.microsoft.com/office/drawing/2014/main" id="{6C264928-EACB-4739-BDDA-6799C99356F3}"/>
               </a:ext>
             </a:extLst>
           </p:cNvPr>
@@ -2201,7 +2201,7 @@
           <p:cNvPr id="3" name="TextBox 2">
             <a:extLst>
               <a:ext uri="{FF2B5EF4-FFF2-40B4-BE49-F238E27FC236}">
-                <a16:creationId xmlns:a16="http://schemas.microsoft.com/office/drawing/2014/main" xmlns="" id="{2361D872-7EC7-439F-A588-B1D90CB7A92F}"/>
+                <a16:creationId xmlns="" xmlns:a16="http://schemas.microsoft.com/office/drawing/2014/main" id="{2361D872-7EC7-439F-A588-B1D90CB7A92F}"/>
               </a:ext>
             </a:extLst>
           </p:cNvPr>
@@ -2422,7 +2422,7 @@
           <p:cNvPr id="3" name="TextBox 2">
             <a:extLst>
               <a:ext uri="{FF2B5EF4-FFF2-40B4-BE49-F238E27FC236}">
-                <a16:creationId xmlns:a16="http://schemas.microsoft.com/office/drawing/2014/main" xmlns="" id="{2361D872-7EC7-439F-A588-B1D90CB7A92F}"/>
+                <a16:creationId xmlns="" xmlns:a16="http://schemas.microsoft.com/office/drawing/2014/main" id="{2361D872-7EC7-439F-A588-B1D90CB7A92F}"/>
               </a:ext>
             </a:extLst>
           </p:cNvPr>
@@ -2803,7 +2803,7 @@
           <p:cNvPr id="3" name="TextBox 2">
             <a:extLst>
               <a:ext uri="{FF2B5EF4-FFF2-40B4-BE49-F238E27FC236}">
-                <a16:creationId xmlns:a16="http://schemas.microsoft.com/office/drawing/2014/main" xmlns="" id="{2361D872-7EC7-439F-A588-B1D90CB7A92F}"/>
+                <a16:creationId xmlns="" xmlns:a16="http://schemas.microsoft.com/office/drawing/2014/main" id="{2361D872-7EC7-439F-A588-B1D90CB7A92F}"/>
               </a:ext>
             </a:extLst>
           </p:cNvPr>
@@ -3034,7 +3034,7 @@
           <p:cNvPr id="3" name="TextBox 2">
             <a:extLst>
               <a:ext uri="{FF2B5EF4-FFF2-40B4-BE49-F238E27FC236}">
-                <a16:creationId xmlns:a16="http://schemas.microsoft.com/office/drawing/2014/main" xmlns="" id="{2361D872-7EC7-439F-A588-B1D90CB7A92F}"/>
+                <a16:creationId xmlns="" xmlns:a16="http://schemas.microsoft.com/office/drawing/2014/main" id="{2361D872-7EC7-439F-A588-B1D90CB7A92F}"/>
               </a:ext>
             </a:extLst>
           </p:cNvPr>
@@ -3126,8 +3126,13 @@
             </a:r>
             <a:r>
               <a:rPr lang="en-US" dirty="0"/>
-              <a:t> as input.</a:t>
-            </a:r>
+              <a:t> as input</a:t>
+            </a:r>
+            <a:r>
+              <a:rPr lang="en-US" dirty="0" smtClean="0"/>
+              <a:t>.</a:t>
+            </a:r>
+            <a:endParaRPr lang="en-US" dirty="0"/>
           </a:p>
           <a:p>
             <a:pPr marL="457200" indent="-457200">
@@ -3274,10 +3279,20 @@
             </a:r>
           </a:p>
           <a:p>
-            <a:pPr marL="457200" indent="-457200">
-              <a:buFont typeface="+mj-lt"/>
-              <a:buAutoNum type="arabicPeriod"/>
-            </a:pPr>
+            <a:r>
+              <a:rPr lang="en-US" dirty="0"/>
+              <a:t>GITHUB </a:t>
+            </a:r>
+            <a:r>
+              <a:rPr lang="en-US" dirty="0" smtClean="0"/>
+              <a:t>LINK:</a:t>
+            </a:r>
+            <a:r>
+              <a:rPr lang="en-US" dirty="0" smtClean="0">
+                <a:hlinkClick r:id="rId2"/>
+              </a:rPr>
+              <a:t>CROP RECOMMENDER</a:t>
+            </a:r>
             <a:endParaRPr lang="en-US" dirty="0"/>
           </a:p>
         </p:txBody>
@@ -3317,7 +3332,7 @@
           <p:cNvPr id="3" name="TextBox 2">
             <a:extLst>
               <a:ext uri="{FF2B5EF4-FFF2-40B4-BE49-F238E27FC236}">
-                <a16:creationId xmlns:a16="http://schemas.microsoft.com/office/drawing/2014/main" xmlns="" id="{2361D872-7EC7-439F-A588-B1D90CB7A92F}"/>
+                <a16:creationId xmlns="" xmlns:a16="http://schemas.microsoft.com/office/drawing/2014/main" id="{2361D872-7EC7-439F-A588-B1D90CB7A92F}"/>
               </a:ext>
             </a:extLst>
           </p:cNvPr>
@@ -3580,7 +3595,7 @@
           <p:cNvPr id="3" name="TextBox 2">
             <a:extLst>
               <a:ext uri="{FF2B5EF4-FFF2-40B4-BE49-F238E27FC236}">
-                <a16:creationId xmlns:a16="http://schemas.microsoft.com/office/drawing/2014/main" xmlns="" id="{2361D872-7EC7-439F-A588-B1D90CB7A92F}"/>
+                <a16:creationId xmlns="" xmlns:a16="http://schemas.microsoft.com/office/drawing/2014/main" id="{2361D872-7EC7-439F-A588-B1D90CB7A92F}"/>
               </a:ext>
             </a:extLst>
           </p:cNvPr>
@@ -3682,7 +3697,7 @@
           <p:cNvPr id="7" name="TextBox 6">
             <a:extLst>
               <a:ext uri="{FF2B5EF4-FFF2-40B4-BE49-F238E27FC236}">
-                <a16:creationId xmlns:a16="http://schemas.microsoft.com/office/drawing/2014/main" xmlns="" id="{2361D872-7EC7-439F-A588-B1D90CB7A92F}"/>
+                <a16:creationId xmlns="" xmlns:a16="http://schemas.microsoft.com/office/drawing/2014/main" id="{2361D872-7EC7-439F-A588-B1D90CB7A92F}"/>
               </a:ext>
             </a:extLst>
           </p:cNvPr>
@@ -3726,7 +3741,7 @@
           <p:cNvPr id="8" name="TextBox 7">
             <a:extLst>
               <a:ext uri="{FF2B5EF4-FFF2-40B4-BE49-F238E27FC236}">
-                <a16:creationId xmlns:a16="http://schemas.microsoft.com/office/drawing/2014/main" xmlns="" id="{2361D872-7EC7-439F-A588-B1D90CB7A92F}"/>
+                <a16:creationId xmlns="" xmlns:a16="http://schemas.microsoft.com/office/drawing/2014/main" id="{2361D872-7EC7-439F-A588-B1D90CB7A92F}"/>
               </a:ext>
             </a:extLst>
           </p:cNvPr>
@@ -4058,7 +4073,7 @@
   <a:extraClrSchemeLst/>
   <a:extLst>
     <a:ext uri="{05A4C25C-085E-4340-85A3-A5531E510DB2}">
-      <thm15:themeFamily xmlns:thm15="http://schemas.microsoft.com/office/thememl/2012/main" xmlns="" name="Session 01 Design Thinking &amp; Critical Thinking" id="{1DE73F69-F87A-4ED3-81C1-82D2BA622E0C}" vid="{37568650-F724-47C7-905E-9640F8017497}"/>
+      <thm15:themeFamily xmlns="" xmlns:thm15="http://schemas.microsoft.com/office/thememl/2012/main" name="Session 01 Design Thinking &amp; Critical Thinking" id="{1DE73F69-F87A-4ED3-81C1-82D2BA622E0C}" vid="{37568650-F724-47C7-905E-9640F8017497}"/>
     </a:ext>
   </a:extLst>
 </a:theme>

</xml_diff>